<commit_message>
fix typo in presentation
</commit_message>
<xml_diff>
--- a/docs/presentation.pptx
+++ b/docs/presentation.pptx
@@ -50,7 +50,7 @@
         <p:spPr>
           <a:xfrm>
             <a:off x="504000" y="226080"/>
-            <a:ext cx="9070920" cy="945720"/>
+            <a:ext cx="9070560" cy="945360"/>
           </a:xfrm>
           <a:prstGeom prst="rect">
             <a:avLst/>
@@ -90,7 +90,7 @@
         <p:spPr>
           <a:xfrm>
             <a:off x="504000" y="1326600"/>
-            <a:ext cx="9070920" cy="3287520"/>
+            <a:ext cx="9070560" cy="3287160"/>
           </a:xfrm>
           <a:prstGeom prst="rect">
             <a:avLst/>
@@ -154,7 +154,7 @@
         <p:txBody>
           <a:bodyPr/>
           <a:p>
-            <a:fld id="{FADFD661-81B6-431E-A9C9-2402DFDF0D89}" type="slidenum">
+            <a:fld id="{C17AD06A-80BF-4D4C-8638-F603837D179E}" type="slidenum">
               <a:t>&lt;#&gt;</a:t>
             </a:fld>
           </a:p>
@@ -216,7 +216,7 @@
         <p:spPr>
           <a:xfrm>
             <a:off x="504000" y="226080"/>
-            <a:ext cx="9070920" cy="945720"/>
+            <a:ext cx="9070560" cy="945360"/>
           </a:xfrm>
           <a:prstGeom prst="rect">
             <a:avLst/>
@@ -256,7 +256,7 @@
         <p:spPr>
           <a:xfrm>
             <a:off x="504000" y="1326600"/>
-            <a:ext cx="9070920" cy="3287520"/>
+            <a:ext cx="9070560" cy="3287160"/>
           </a:xfrm>
           <a:prstGeom prst="rect">
             <a:avLst/>
@@ -317,7 +317,7 @@
         <p:txBody>
           <a:bodyPr/>
           <a:p>
-            <a:fld id="{CB0B38B6-B187-49CB-84BC-31C0CE65C2C1}" type="slidenum">
+            <a:fld id="{5C796F1B-A4B6-415F-9F4E-77387F7926EF}" type="slidenum">
               <a:t>&lt;#&gt;</a:t>
             </a:fld>
           </a:p>
@@ -379,7 +379,7 @@
         <p:spPr>
           <a:xfrm>
             <a:off x="504000" y="226080"/>
-            <a:ext cx="9070920" cy="945720"/>
+            <a:ext cx="9070560" cy="945360"/>
           </a:xfrm>
           <a:prstGeom prst="rect">
             <a:avLst/>
@@ -428,7 +428,7 @@
         <p:spPr>
           <a:xfrm>
             <a:off x="504000" y="1326600"/>
-            <a:ext cx="9070920" cy="3287520"/>
+            <a:ext cx="9070560" cy="3287160"/>
           </a:xfrm>
           <a:prstGeom prst="rect">
             <a:avLst/>
@@ -653,7 +653,7 @@
         <p:spPr>
           <a:xfrm>
             <a:off x="3447360" y="5165280"/>
-            <a:ext cx="3194280" cy="389880"/>
+            <a:ext cx="3193920" cy="389520"/>
           </a:xfrm>
           <a:prstGeom prst="rect">
             <a:avLst/>
@@ -725,7 +725,7 @@
         <p:spPr>
           <a:xfrm>
             <a:off x="7227360" y="5165280"/>
-            <a:ext cx="2347560" cy="389880"/>
+            <a:ext cx="2347200" cy="389520"/>
           </a:xfrm>
           <a:prstGeom prst="rect">
             <a:avLst/>
@@ -766,7 +766,7 @@
                 <a:tab algn="l" pos="0"/>
               </a:tabLst>
             </a:pPr>
-            <a:fld id="{643CEDED-73FA-4DA5-842B-531AEF75A239}" type="slidenum">
+            <a:fld id="{7F1FF1AB-F0D0-494B-A058-B67E6E3CA2E5}" type="slidenum">
               <a:rPr b="0" lang="en-US" sz="1400" spc="-1" strike="noStrike">
                 <a:solidFill>
                   <a:srgbClr val="000000"/>
@@ -797,7 +797,7 @@
         <p:spPr>
           <a:xfrm>
             <a:off x="504000" y="5165280"/>
-            <a:ext cx="2347560" cy="389880"/>
+            <a:ext cx="2347200" cy="389520"/>
           </a:xfrm>
           <a:prstGeom prst="rect">
             <a:avLst/>
@@ -883,7 +883,7 @@
         <p:spPr>
           <a:xfrm>
             <a:off x="504000" y="226080"/>
-            <a:ext cx="9070920" cy="945720"/>
+            <a:ext cx="9070560" cy="945360"/>
           </a:xfrm>
           <a:prstGeom prst="rect">
             <a:avLst/>
@@ -932,7 +932,7 @@
         <p:spPr>
           <a:xfrm>
             <a:off x="3447360" y="5165280"/>
-            <a:ext cx="3194280" cy="389880"/>
+            <a:ext cx="3193920" cy="389520"/>
           </a:xfrm>
           <a:prstGeom prst="rect">
             <a:avLst/>
@@ -1004,7 +1004,7 @@
         <p:spPr>
           <a:xfrm>
             <a:off x="7227360" y="5165280"/>
-            <a:ext cx="2347560" cy="389880"/>
+            <a:ext cx="2347200" cy="389520"/>
           </a:xfrm>
           <a:prstGeom prst="rect">
             <a:avLst/>
@@ -1045,7 +1045,7 @@
                 <a:tab algn="l" pos="0"/>
               </a:tabLst>
             </a:pPr>
-            <a:fld id="{B07CB38A-273B-4D8D-92B8-4DF80CEFFB25}" type="slidenum">
+            <a:fld id="{AB35E70A-6796-4D50-B05E-D02A71917D83}" type="slidenum">
               <a:rPr b="0" lang="en-US" sz="1400" spc="-1" strike="noStrike">
                 <a:solidFill>
                   <a:srgbClr val="000000"/>
@@ -1076,7 +1076,7 @@
         <p:spPr>
           <a:xfrm>
             <a:off x="504000" y="5165280"/>
-            <a:ext cx="2347560" cy="389880"/>
+            <a:ext cx="2347200" cy="389520"/>
           </a:xfrm>
           <a:prstGeom prst="rect">
             <a:avLst/>
@@ -1387,7 +1387,7 @@
         <p:spPr>
           <a:xfrm>
             <a:off x="504000" y="226080"/>
-            <a:ext cx="9070920" cy="945720"/>
+            <a:ext cx="9070560" cy="945360"/>
           </a:xfrm>
           <a:prstGeom prst="rect">
             <a:avLst/>
@@ -1442,7 +1442,7 @@
         <p:spPr>
           <a:xfrm>
             <a:off x="504000" y="1326600"/>
-            <a:ext cx="9070920" cy="3287520"/>
+            <a:ext cx="9070560" cy="3287160"/>
           </a:xfrm>
           <a:prstGeom prst="rect">
             <a:avLst/>
@@ -1529,7 +1529,7 @@
         <p:spPr>
           <a:xfrm>
             <a:off x="504000" y="226080"/>
-            <a:ext cx="9070920" cy="945720"/>
+            <a:ext cx="9070560" cy="945360"/>
           </a:xfrm>
           <a:prstGeom prst="rect">
             <a:avLst/>
@@ -1584,7 +1584,7 @@
         <p:spPr>
           <a:xfrm>
             <a:off x="1371600" y="2057400"/>
-            <a:ext cx="7746120" cy="2101680"/>
+            <a:ext cx="7745760" cy="2101320"/>
           </a:xfrm>
           <a:prstGeom prst="rect">
             <a:avLst/>
@@ -1742,7 +1742,7 @@
         <p:spPr>
           <a:xfrm>
             <a:off x="504000" y="226080"/>
-            <a:ext cx="9070920" cy="945720"/>
+            <a:ext cx="9070560" cy="945360"/>
           </a:xfrm>
           <a:prstGeom prst="rect">
             <a:avLst/>
@@ -1797,7 +1797,7 @@
         <p:spPr>
           <a:xfrm>
             <a:off x="504000" y="1600200"/>
-            <a:ext cx="9070920" cy="2787840"/>
+            <a:ext cx="9070560" cy="2787480"/>
           </a:xfrm>
           <a:prstGeom prst="rect">
             <a:avLst/>
@@ -1901,7 +1901,7 @@
                 </a:solidFill>
                 <a:latin typeface="Arial"/>
               </a:rPr>
-              <a:t>Dapp aaply to each pool, a deadline,</a:t>
+              <a:t>Dapp apply to each pool, a deadline,</a:t>
             </a:r>
             <a:endParaRPr b="0" lang="en-US" sz="1800" spc="-1" strike="noStrike">
               <a:solidFill>
@@ -2021,7 +2021,7 @@
         <p:spPr>
           <a:xfrm>
             <a:off x="504000" y="226080"/>
-            <a:ext cx="9070920" cy="945720"/>
+            <a:ext cx="9070560" cy="945360"/>
           </a:xfrm>
           <a:prstGeom prst="rect">
             <a:avLst/>
@@ -2076,7 +2076,7 @@
         <p:spPr>
           <a:xfrm>
             <a:off x="457200" y="1371600"/>
-            <a:ext cx="8915400" cy="3853080"/>
+            <a:ext cx="8915040" cy="3852720"/>
           </a:xfrm>
           <a:prstGeom prst="rect">
             <a:avLst/>
@@ -2129,7 +2129,7 @@
         <p:spPr>
           <a:xfrm>
             <a:off x="504000" y="226080"/>
-            <a:ext cx="9070920" cy="945720"/>
+            <a:ext cx="9070560" cy="945360"/>
           </a:xfrm>
           <a:prstGeom prst="rect">
             <a:avLst/>
@@ -2184,7 +2184,7 @@
         <p:spPr>
           <a:xfrm>
             <a:off x="504000" y="1326600"/>
-            <a:ext cx="9070920" cy="3287520"/>
+            <a:ext cx="9070560" cy="3287160"/>
           </a:xfrm>
           <a:prstGeom prst="rect">
             <a:avLst/>
@@ -2199,7 +2199,7 @@
             <a:normAutofit/>
           </a:bodyPr>
           <a:p>
-            <a:pPr indent="-324000">
+            <a:pPr marL="432000" indent="-324000">
               <a:lnSpc>
                 <a:spcPct val="100000"/>
               </a:lnSpc>
@@ -2332,7 +2332,7 @@
         <p:spPr>
           <a:xfrm>
             <a:off x="457200" y="228600"/>
-            <a:ext cx="9070920" cy="945720"/>
+            <a:ext cx="9070560" cy="945360"/>
           </a:xfrm>
           <a:prstGeom prst="rect">
             <a:avLst/>
@@ -2387,7 +2387,7 @@
         <p:spPr>
           <a:xfrm>
             <a:off x="504000" y="1326600"/>
-            <a:ext cx="9070920" cy="3287520"/>
+            <a:ext cx="9070560" cy="3287160"/>
           </a:xfrm>
           <a:prstGeom prst="rect">
             <a:avLst/>
@@ -2473,7 +2473,7 @@
         <p:spPr>
           <a:xfrm>
             <a:off x="504000" y="226080"/>
-            <a:ext cx="9070920" cy="945720"/>
+            <a:ext cx="9070560" cy="945360"/>
           </a:xfrm>
           <a:prstGeom prst="rect">
             <a:avLst/>
@@ -2528,7 +2528,7 @@
         <p:spPr>
           <a:xfrm>
             <a:off x="504000" y="1326600"/>
-            <a:ext cx="9070920" cy="3287520"/>
+            <a:ext cx="9070560" cy="3287160"/>
           </a:xfrm>
           <a:prstGeom prst="rect">
             <a:avLst/>
@@ -2614,7 +2614,7 @@
         <p:spPr>
           <a:xfrm>
             <a:off x="504000" y="226080"/>
-            <a:ext cx="9070920" cy="945720"/>
+            <a:ext cx="9070560" cy="945360"/>
           </a:xfrm>
           <a:prstGeom prst="rect">
             <a:avLst/>

</xml_diff>